<commit_message>
PLC protocolos e Supervisórios 22Mai2025
</commit_message>
<xml_diff>
--- a/01 Classes/Aula10 - CLP - Recomendações Projetos Supervisórios.pptx
+++ b/01 Classes/Aula10 - CLP - Recomendações Projetos Supervisórios.pptx
@@ -5104,7 +5104,21 @@
                 <a:latin typeface="Times New Roman" panose="02020603050405020304" pitchFamily="18" charset="0"/>
                 <a:cs typeface="Times New Roman" panose="02020603050405020304" pitchFamily="18" charset="0"/>
               </a:rPr>
-              <a:t>Seja claro e objetivo;</a:t>
+              <a:t>Seja </a:t>
+            </a:r>
+            <a:r>
+              <a:rPr lang="pt-BR" sz="2400" b="1" dirty="0">
+                <a:latin typeface="Times New Roman" panose="02020603050405020304" pitchFamily="18" charset="0"/>
+                <a:cs typeface="Times New Roman" panose="02020603050405020304" pitchFamily="18" charset="0"/>
+              </a:rPr>
+              <a:t>claro e objetivo</a:t>
+            </a:r>
+            <a:r>
+              <a:rPr lang="pt-BR" sz="2400" dirty="0">
+                <a:latin typeface="Times New Roman" panose="02020603050405020304" pitchFamily="18" charset="0"/>
+                <a:cs typeface="Times New Roman" panose="02020603050405020304" pitchFamily="18" charset="0"/>
+              </a:rPr>
+              <a:t>;</a:t>
             </a:r>
           </a:p>
           <a:p>
@@ -5117,11 +5131,21 @@
           <a:p>
             <a:pPr algn="just"/>
             <a:r>
+              <a:rPr lang="pt-BR" sz="2400" b="1" dirty="0">
+                <a:solidFill>
+                  <a:srgbClr val="FF0000"/>
+                </a:solidFill>
+                <a:latin typeface="Times New Roman" panose="02020603050405020304" pitchFamily="18" charset="0"/>
+                <a:cs typeface="Times New Roman" panose="02020603050405020304" pitchFamily="18" charset="0"/>
+              </a:rPr>
+              <a:t>Evite plágio </a:t>
+            </a:r>
+            <a:r>
               <a:rPr lang="pt-BR" sz="2400" dirty="0">
                 <a:latin typeface="Times New Roman" panose="02020603050405020304" pitchFamily="18" charset="0"/>
                 <a:cs typeface="Times New Roman" panose="02020603050405020304" pitchFamily="18" charset="0"/>
               </a:rPr>
-              <a:t>Evite plágio (cite corretamente </a:t>
+              <a:t>(cite corretamente, </a:t>
             </a:r>
             <a:r>
               <a:rPr lang="pt-BR" sz="2400" b="1" dirty="0">
@@ -5152,7 +5176,21 @@
                 <a:latin typeface="Times New Roman" panose="02020603050405020304" pitchFamily="18" charset="0"/>
                 <a:cs typeface="Times New Roman" panose="02020603050405020304" pitchFamily="18" charset="0"/>
               </a:rPr>
-              <a:t>Use normas da ABNT ou da instituição.</a:t>
+              <a:t>Use </a:t>
+            </a:r>
+            <a:r>
+              <a:rPr lang="pt-BR" sz="2400" b="1" dirty="0">
+                <a:latin typeface="Times New Roman" panose="02020603050405020304" pitchFamily="18" charset="0"/>
+                <a:cs typeface="Times New Roman" panose="02020603050405020304" pitchFamily="18" charset="0"/>
+              </a:rPr>
+              <a:t>normas da ABNT </a:t>
+            </a:r>
+            <a:r>
+              <a:rPr lang="pt-BR" sz="2400" dirty="0">
+                <a:latin typeface="Times New Roman" panose="02020603050405020304" pitchFamily="18" charset="0"/>
+                <a:cs typeface="Times New Roman" panose="02020603050405020304" pitchFamily="18" charset="0"/>
+              </a:rPr>
+              <a:t>ou da Instituição.</a:t>
             </a:r>
           </a:p>
           <a:p>
@@ -5308,11 +5346,28 @@
           <a:p>
             <a:pPr algn="just"/>
             <a:r>
+              <a:rPr lang="pt-BR" sz="2400" b="1" dirty="0">
+                <a:latin typeface="Times New Roman" panose="02020603050405020304" pitchFamily="18" charset="0"/>
+                <a:cs typeface="Times New Roman" panose="02020603050405020304" pitchFamily="18" charset="0"/>
+              </a:rPr>
+              <a:t>Elabore slides </a:t>
+            </a:r>
+            <a:r>
+              <a:rPr lang="pt-BR" sz="2400" b="1" dirty="0">
+                <a:solidFill>
+                  <a:srgbClr val="FF0000"/>
+                </a:solidFill>
+                <a:latin typeface="Times New Roman" panose="02020603050405020304" pitchFamily="18" charset="0"/>
+                <a:cs typeface="Times New Roman" panose="02020603050405020304" pitchFamily="18" charset="0"/>
+              </a:rPr>
+              <a:t>claros e objetivos</a:t>
+            </a:r>
+            <a:r>
               <a:rPr lang="pt-BR" sz="2400" dirty="0">
                 <a:latin typeface="Times New Roman" panose="02020603050405020304" pitchFamily="18" charset="0"/>
                 <a:cs typeface="Times New Roman" panose="02020603050405020304" pitchFamily="18" charset="0"/>
               </a:rPr>
-              <a:t>Elabore slides claros e objetivos;</a:t>
+              <a:t>;</a:t>
             </a:r>
           </a:p>
           <a:p>
@@ -5325,11 +5380,35 @@
           <a:p>
             <a:pPr algn="just"/>
             <a:r>
+              <a:rPr lang="pt-BR" sz="2400" b="1" dirty="0">
+                <a:latin typeface="Times New Roman" panose="02020603050405020304" pitchFamily="18" charset="0"/>
+                <a:cs typeface="Times New Roman" panose="02020603050405020304" pitchFamily="18" charset="0"/>
+              </a:rPr>
+              <a:t>Pratique a oratória</a:t>
+            </a:r>
+            <a:r>
               <a:rPr lang="pt-BR" sz="2400" dirty="0">
                 <a:latin typeface="Times New Roman" panose="02020603050405020304" pitchFamily="18" charset="0"/>
                 <a:cs typeface="Times New Roman" panose="02020603050405020304" pitchFamily="18" charset="0"/>
               </a:rPr>
-              <a:t>Pratique a oratória: postura, voz e tempo;</a:t>
+              <a:t>: </a:t>
+            </a:r>
+            <a:r>
+              <a:rPr lang="pt-BR" sz="2400" b="1" dirty="0">
+                <a:solidFill>
+                  <a:srgbClr val="FF0000"/>
+                </a:solidFill>
+                <a:latin typeface="Times New Roman" panose="02020603050405020304" pitchFamily="18" charset="0"/>
+                <a:cs typeface="Times New Roman" panose="02020603050405020304" pitchFamily="18" charset="0"/>
+              </a:rPr>
+              <a:t>postura, voz e tempo</a:t>
+            </a:r>
+            <a:r>
+              <a:rPr lang="pt-BR" sz="2400" dirty="0">
+                <a:latin typeface="Times New Roman" panose="02020603050405020304" pitchFamily="18" charset="0"/>
+                <a:cs typeface="Times New Roman" panose="02020603050405020304" pitchFamily="18" charset="0"/>
+              </a:rPr>
+              <a:t>;</a:t>
             </a:r>
           </a:p>
           <a:p>
@@ -5342,11 +5421,18 @@
           <a:p>
             <a:pPr algn="just"/>
             <a:r>
+              <a:rPr lang="pt-BR" sz="2400" b="1" dirty="0">
+                <a:latin typeface="Times New Roman" panose="02020603050405020304" pitchFamily="18" charset="0"/>
+                <a:cs typeface="Times New Roman" panose="02020603050405020304" pitchFamily="18" charset="0"/>
+              </a:rPr>
+              <a:t>Use protótipos, vídeos </a:t>
+            </a:r>
+            <a:r>
               <a:rPr lang="pt-BR" sz="2400" dirty="0">
                 <a:latin typeface="Times New Roman" panose="02020603050405020304" pitchFamily="18" charset="0"/>
                 <a:cs typeface="Times New Roman" panose="02020603050405020304" pitchFamily="18" charset="0"/>
               </a:rPr>
-              <a:t>Use protótipos, vídeos ou demonstrações se possível.</a:t>
+              <a:t>ou demonstrações se possível.</a:t>
             </a:r>
           </a:p>
           <a:p>
@@ -6472,11 +6558,35 @@
               <a:buNone/>
             </a:pPr>
             <a:r>
+              <a:rPr lang="pt-BR" sz="2200" b="1" dirty="0">
+                <a:latin typeface="Times New Roman" panose="02020603050405020304" pitchFamily="18" charset="0"/>
+                <a:cs typeface="Times New Roman" panose="02020603050405020304" pitchFamily="18" charset="0"/>
+              </a:rPr>
+              <a:t>Projetos bem-sucedidos </a:t>
+            </a:r>
+            <a:r>
               <a:rPr lang="pt-BR" sz="2200" dirty="0">
                 <a:latin typeface="Times New Roman" panose="02020603050405020304" pitchFamily="18" charset="0"/>
                 <a:cs typeface="Times New Roman" panose="02020603050405020304" pitchFamily="18" charset="0"/>
               </a:rPr>
-              <a:t>Projetos bem-sucedidos são fruto de organização e colaboração.</a:t>
+              <a:t>são fruto de </a:t>
+            </a:r>
+            <a:r>
+              <a:rPr lang="pt-BR" sz="2200" b="1" dirty="0">
+                <a:solidFill>
+                  <a:srgbClr val="FF0000"/>
+                </a:solidFill>
+                <a:latin typeface="Times New Roman" panose="02020603050405020304" pitchFamily="18" charset="0"/>
+                <a:cs typeface="Times New Roman" panose="02020603050405020304" pitchFamily="18" charset="0"/>
+              </a:rPr>
+              <a:t>organização e colaboração</a:t>
+            </a:r>
+            <a:r>
+              <a:rPr lang="pt-BR" sz="2200" dirty="0">
+                <a:latin typeface="Times New Roman" panose="02020603050405020304" pitchFamily="18" charset="0"/>
+                <a:cs typeface="Times New Roman" panose="02020603050405020304" pitchFamily="18" charset="0"/>
+              </a:rPr>
+              <a:t>.</a:t>
             </a:r>
           </a:p>
           <a:p>
@@ -6497,7 +6607,38 @@
                 <a:latin typeface="Times New Roman" panose="02020603050405020304" pitchFamily="18" charset="0"/>
                 <a:cs typeface="Times New Roman" panose="02020603050405020304" pitchFamily="18" charset="0"/>
               </a:rPr>
-              <a:t>Usem as recomendações como guia ao longo do projeto.</a:t>
+              <a:t>Usem as </a:t>
+            </a:r>
+            <a:r>
+              <a:rPr lang="pt-BR" sz="2200" b="1" dirty="0">
+                <a:latin typeface="Times New Roman" panose="02020603050405020304" pitchFamily="18" charset="0"/>
+                <a:cs typeface="Times New Roman" panose="02020603050405020304" pitchFamily="18" charset="0"/>
+              </a:rPr>
+              <a:t>recomendações</a:t>
+            </a:r>
+            <a:r>
+              <a:rPr lang="pt-BR" sz="2200" dirty="0">
+                <a:latin typeface="Times New Roman" panose="02020603050405020304" pitchFamily="18" charset="0"/>
+                <a:cs typeface="Times New Roman" panose="02020603050405020304" pitchFamily="18" charset="0"/>
+              </a:rPr>
+              <a:t> como </a:t>
+            </a:r>
+            <a:r>
+              <a:rPr lang="pt-BR" sz="2200" b="1" dirty="0">
+                <a:solidFill>
+                  <a:srgbClr val="FF0000"/>
+                </a:solidFill>
+                <a:latin typeface="Times New Roman" panose="02020603050405020304" pitchFamily="18" charset="0"/>
+                <a:cs typeface="Times New Roman" panose="02020603050405020304" pitchFamily="18" charset="0"/>
+              </a:rPr>
+              <a:t>guia ao longo do projeto</a:t>
+            </a:r>
+            <a:r>
+              <a:rPr lang="pt-BR" sz="2200" dirty="0">
+                <a:latin typeface="Times New Roman" panose="02020603050405020304" pitchFamily="18" charset="0"/>
+                <a:cs typeface="Times New Roman" panose="02020603050405020304" pitchFamily="18" charset="0"/>
+              </a:rPr>
+              <a:t>.</a:t>
             </a:r>
           </a:p>
           <a:p>
@@ -6580,7 +6721,52 @@
                 <a:latin typeface="Times New Roman" panose="02020603050405020304" pitchFamily="18" charset="0"/>
                 <a:cs typeface="Times New Roman" panose="02020603050405020304" pitchFamily="18" charset="0"/>
               </a:rPr>
-              <a:t> exige mais rigor científico e teórico, focando em pesquisa e escrita acadêmica.</a:t>
+              <a:t> exige mais </a:t>
+            </a:r>
+            <a:r>
+              <a:rPr lang="pt-BR" sz="2200" b="1" dirty="0">
+                <a:latin typeface="Times New Roman" panose="02020603050405020304" pitchFamily="18" charset="0"/>
+                <a:cs typeface="Times New Roman" panose="02020603050405020304" pitchFamily="18" charset="0"/>
+              </a:rPr>
+              <a:t>rigor</a:t>
+            </a:r>
+            <a:r>
+              <a:rPr lang="pt-BR" sz="2200" dirty="0">
+                <a:latin typeface="Times New Roman" panose="02020603050405020304" pitchFamily="18" charset="0"/>
+                <a:cs typeface="Times New Roman" panose="02020603050405020304" pitchFamily="18" charset="0"/>
+              </a:rPr>
+              <a:t> </a:t>
+            </a:r>
+            <a:r>
+              <a:rPr lang="pt-BR" sz="2200" b="1" dirty="0">
+                <a:solidFill>
+                  <a:srgbClr val="FF0000"/>
+                </a:solidFill>
+                <a:latin typeface="Times New Roman" panose="02020603050405020304" pitchFamily="18" charset="0"/>
+                <a:cs typeface="Times New Roman" panose="02020603050405020304" pitchFamily="18" charset="0"/>
+              </a:rPr>
+              <a:t>científico e teórico</a:t>
+            </a:r>
+            <a:r>
+              <a:rPr lang="pt-BR" sz="2200" dirty="0">
+                <a:latin typeface="Times New Roman" panose="02020603050405020304" pitchFamily="18" charset="0"/>
+                <a:cs typeface="Times New Roman" panose="02020603050405020304" pitchFamily="18" charset="0"/>
+              </a:rPr>
+              <a:t>, focando em </a:t>
+            </a:r>
+            <a:r>
+              <a:rPr lang="pt-BR" sz="2200" b="1" dirty="0">
+                <a:latin typeface="Times New Roman" panose="02020603050405020304" pitchFamily="18" charset="0"/>
+                <a:cs typeface="Times New Roman" panose="02020603050405020304" pitchFamily="18" charset="0"/>
+              </a:rPr>
+              <a:t>pesquisa e escrita acadêmica</a:t>
+            </a:r>
+            <a:r>
+              <a:rPr lang="pt-BR" sz="2200" dirty="0">
+                <a:latin typeface="Times New Roman" panose="02020603050405020304" pitchFamily="18" charset="0"/>
+                <a:cs typeface="Times New Roman" panose="02020603050405020304" pitchFamily="18" charset="0"/>
+              </a:rPr>
+              <a:t>.</a:t>
             </a:r>
           </a:p>
         </p:txBody>
@@ -9959,7 +10145,24 @@
                 <a:latin typeface="Times New Roman" panose="02020603050405020304" pitchFamily="18" charset="0"/>
                 <a:cs typeface="Times New Roman" panose="02020603050405020304" pitchFamily="18" charset="0"/>
               </a:rPr>
-              <a:t>e objetivos mensuráveis;</a:t>
+              <a:t>e </a:t>
+            </a:r>
+            <a:r>
+              <a:rPr lang="pt-BR" sz="2200" b="1" dirty="0">
+                <a:solidFill>
+                  <a:srgbClr val="FF0000"/>
+                </a:solidFill>
+                <a:latin typeface="Times New Roman" panose="02020603050405020304" pitchFamily="18" charset="0"/>
+                <a:cs typeface="Times New Roman" panose="02020603050405020304" pitchFamily="18" charset="0"/>
+              </a:rPr>
+              <a:t>objetivos mensuráveis</a:t>
+            </a:r>
+            <a:r>
+              <a:rPr lang="pt-BR" sz="2200" dirty="0">
+                <a:latin typeface="Times New Roman" panose="02020603050405020304" pitchFamily="18" charset="0"/>
+                <a:cs typeface="Times New Roman" panose="02020603050405020304" pitchFamily="18" charset="0"/>
+              </a:rPr>
+              <a:t>;</a:t>
             </a:r>
           </a:p>
           <a:p>
@@ -10024,21 +10227,34 @@
                 <a:latin typeface="Times New Roman" panose="02020603050405020304" pitchFamily="18" charset="0"/>
                 <a:cs typeface="Times New Roman" panose="02020603050405020304" pitchFamily="18" charset="0"/>
               </a:rPr>
-              <a:t> (uso de ferramentas como </a:t>
-            </a:r>
-            <a:r>
-              <a:rPr lang="pt-BR" sz="2200" dirty="0" err="1">
+              <a:t> (uso de ferramentas: </a:t>
+            </a:r>
+            <a:r>
+              <a:rPr lang="pt-BR" sz="2200" b="1" dirty="0" err="1">
+                <a:solidFill>
+                  <a:srgbClr val="FF0000"/>
+                </a:solidFill>
                 <a:latin typeface="Times New Roman" panose="02020603050405020304" pitchFamily="18" charset="0"/>
                 <a:cs typeface="Times New Roman" panose="02020603050405020304" pitchFamily="18" charset="0"/>
               </a:rPr>
               <a:t>Gantt</a:t>
             </a:r>
             <a:r>
+              <a:rPr lang="pt-BR" sz="2200" b="1" dirty="0">
+                <a:solidFill>
+                  <a:srgbClr val="FF0000"/>
+                </a:solidFill>
+                <a:latin typeface="Times New Roman" panose="02020603050405020304" pitchFamily="18" charset="0"/>
+                <a:cs typeface="Times New Roman" panose="02020603050405020304" pitchFamily="18" charset="0"/>
+              </a:rPr>
+              <a:t>; MS Project</a:t>
+            </a:r>
+            <a:r>
               <a:rPr lang="pt-BR" sz="2200" dirty="0">
                 <a:latin typeface="Times New Roman" panose="02020603050405020304" pitchFamily="18" charset="0"/>
                 <a:cs typeface="Times New Roman" panose="02020603050405020304" pitchFamily="18" charset="0"/>
               </a:rPr>
-              <a:t>; MS Project);</a:t>
+              <a:t>);</a:t>
             </a:r>
           </a:p>
           <a:p>
@@ -10456,11 +10672,18 @@
           <a:p>
             <a:pPr algn="just"/>
             <a:r>
+              <a:rPr lang="pt-BR" sz="2400" b="1" dirty="0">
+                <a:latin typeface="Times New Roman" panose="02020603050405020304" pitchFamily="18" charset="0"/>
+                <a:cs typeface="Times New Roman" panose="02020603050405020304" pitchFamily="18" charset="0"/>
+              </a:rPr>
+              <a:t>Requisitos funcionais </a:t>
+            </a:r>
+            <a:r>
               <a:rPr lang="pt-BR" sz="2400" dirty="0">
                 <a:latin typeface="Times New Roman" panose="02020603050405020304" pitchFamily="18" charset="0"/>
                 <a:cs typeface="Times New Roman" panose="02020603050405020304" pitchFamily="18" charset="0"/>
               </a:rPr>
-              <a:t>Requisitos funcionais: o que o sistema faz;</a:t>
+              <a:t>- RN: o que o sistema faz;</a:t>
             </a:r>
           </a:p>
           <a:p>
@@ -10473,11 +10696,21 @@
           <a:p>
             <a:pPr algn="just"/>
             <a:r>
+              <a:rPr lang="pt-BR" sz="2400" b="1" dirty="0">
+                <a:solidFill>
+                  <a:srgbClr val="FF0000"/>
+                </a:solidFill>
+                <a:latin typeface="Times New Roman" panose="02020603050405020304" pitchFamily="18" charset="0"/>
+                <a:cs typeface="Times New Roman" panose="02020603050405020304" pitchFamily="18" charset="0"/>
+              </a:rPr>
+              <a:t>Requisitos não funcionais </a:t>
+            </a:r>
+            <a:r>
               <a:rPr lang="pt-BR" sz="2400" dirty="0">
                 <a:latin typeface="Times New Roman" panose="02020603050405020304" pitchFamily="18" charset="0"/>
                 <a:cs typeface="Times New Roman" panose="02020603050405020304" pitchFamily="18" charset="0"/>
               </a:rPr>
-              <a:t>Requisitos não funcionais: desempenho, segurança, etc.;</a:t>
+              <a:t>- RNF: desempenho, segurança, etc.;</a:t>
             </a:r>
           </a:p>
           <a:p>
@@ -10490,11 +10723,18 @@
           <a:p>
             <a:pPr algn="just"/>
             <a:r>
+              <a:rPr lang="pt-BR" sz="2400" b="1" dirty="0">
+                <a:latin typeface="Times New Roman" panose="02020603050405020304" pitchFamily="18" charset="0"/>
+                <a:cs typeface="Times New Roman" panose="02020603050405020304" pitchFamily="18" charset="0"/>
+              </a:rPr>
+              <a:t>Escolha das tecnologias</a:t>
+            </a:r>
+            <a:r>
               <a:rPr lang="pt-BR" sz="2400" dirty="0">
                 <a:latin typeface="Times New Roman" panose="02020603050405020304" pitchFamily="18" charset="0"/>
                 <a:cs typeface="Times New Roman" panose="02020603050405020304" pitchFamily="18" charset="0"/>
               </a:rPr>
-              <a:t>Escolha das tecnologias: ferramentas, linguagens, etc.</a:t>
+              <a:t>: ferramentas, linguagens, etc.</a:t>
             </a:r>
           </a:p>
         </p:txBody>

</xml_diff>